<commit_message>
Fixed minor issue in datastream advanced slides
</commit_message>
<xml_diff>
--- a/slides/flink_stream_advanced.pptx
+++ b/slides/flink_stream_advanced.pptx
@@ -141,7 +141,7 @@
   </p:defaultTextStyle>
   <p:extLst>
     <p:ext uri="{EFAFB233-063F-42B5-8137-9DF3F51BA10A}">
-      <p15:sldGuideLst xmlns:p15="http://schemas.microsoft.com/office/powerpoint/2012/main" xmlns="">
+      <p15:sldGuideLst xmlns="" xmlns:p15="http://schemas.microsoft.com/office/powerpoint/2012/main">
         <p15:guide id="1" orient="horz" pos="2160">
           <p15:clr>
             <a:srgbClr val="A4A3A4"/>
@@ -240,7 +240,7 @@
           <a:p>
             <a:fld id="{F01141F9-3E73-7448-86C2-E96D93FE379F}" type="datetimeFigureOut">
               <a:rPr lang="en-US" smtClean="0"/>
-              <a:t>01/09/15</a:t>
+              <a:t>03/09/15</a:t>
             </a:fld>
             <a:endParaRPr lang="en-US"/>
           </a:p>
@@ -13466,7 +13466,34 @@
                 </a:solidFill>
                 <a:latin typeface="Menlo"/>
               </a:rPr>
-              <a:t>", 0L, false);</a:t>
+              <a:t>", 0L</a:t>
+            </a:r>
+            <a:r>
+              <a:rPr lang="en-US" sz="1500" smtClean="0">
+                <a:solidFill>
+                  <a:srgbClr val="000000"/>
+                </a:solidFill>
+                <a:latin typeface="Menlo"/>
+              </a:rPr>
+              <a:t>, </a:t>
+            </a:r>
+            <a:r>
+              <a:rPr lang="en-US" sz="1500" smtClean="0">
+                <a:solidFill>
+                  <a:srgbClr val="000000"/>
+                </a:solidFill>
+                <a:latin typeface="Menlo"/>
+              </a:rPr>
+              <a:t>true)</a:t>
+            </a:r>
+            <a:r>
+              <a:rPr lang="en-US" sz="1500" dirty="0" smtClean="0">
+                <a:solidFill>
+                  <a:srgbClr val="000000"/>
+                </a:solidFill>
+                <a:latin typeface="Menlo"/>
+              </a:rPr>
+              <a:t>;</a:t>
             </a:r>
             <a:endParaRPr lang="en-US" sz="1500" dirty="0">
               <a:solidFill>

</xml_diff>

<commit_message>
Updated DataStream slides and moved Kafka from Basic to Advanced
</commit_message>
<xml_diff>
--- a/slides/flink_stream_advanced.pptx
+++ b/slides/flink_stream_advanced.pptx
@@ -5,7 +5,7 @@
     <p:sldMasterId id="2147483660" r:id="rId1"/>
   </p:sldMasterIdLst>
   <p:notesMasterIdLst>
-    <p:notesMasterId r:id="rId35"/>
+    <p:notesMasterId r:id="rId39"/>
   </p:notesMasterIdLst>
   <p:sldIdLst>
     <p:sldId id="336" r:id="rId2"/>
@@ -38,9 +38,13 @@
     <p:sldId id="345" r:id="rId29"/>
     <p:sldId id="346" r:id="rId30"/>
     <p:sldId id="347" r:id="rId31"/>
-    <p:sldId id="323" r:id="rId32"/>
-    <p:sldId id="363" r:id="rId33"/>
-    <p:sldId id="369" r:id="rId34"/>
+    <p:sldId id="370" r:id="rId32"/>
+    <p:sldId id="371" r:id="rId33"/>
+    <p:sldId id="372" r:id="rId34"/>
+    <p:sldId id="373" r:id="rId35"/>
+    <p:sldId id="323" r:id="rId36"/>
+    <p:sldId id="363" r:id="rId37"/>
+    <p:sldId id="369" r:id="rId38"/>
   </p:sldIdLst>
   <p:sldSz cx="9144000" cy="6858000" type="screen4x3"/>
   <p:notesSz cx="6858000" cy="9144000"/>
@@ -141,7 +145,7 @@
   </p:defaultTextStyle>
   <p:extLst>
     <p:ext uri="{EFAFB233-063F-42B5-8137-9DF3F51BA10A}">
-      <p15:sldGuideLst xmlns="" xmlns:p15="http://schemas.microsoft.com/office/powerpoint/2012/main">
+      <p15:sldGuideLst xmlns:p15="http://schemas.microsoft.com/office/powerpoint/2012/main" xmlns="">
         <p15:guide id="1" orient="horz" pos="2160">
           <p15:clr>
             <a:srgbClr val="A4A3A4"/>
@@ -240,7 +244,7 @@
           <a:p>
             <a:fld id="{F01141F9-3E73-7448-86C2-E96D93FE379F}" type="datetimeFigureOut">
               <a:rPr lang="en-US" smtClean="0"/>
-              <a:t>03/09/15</a:t>
+              <a:t>08/10/15</a:t>
             </a:fld>
             <a:endParaRPr lang="en-US"/>
           </a:p>
@@ -13475,16 +13479,7 @@
                 </a:solidFill>
                 <a:latin typeface="Menlo"/>
               </a:rPr>
-              <a:t>, </a:t>
-            </a:r>
-            <a:r>
-              <a:rPr lang="en-US" sz="1500" smtClean="0">
-                <a:solidFill>
-                  <a:srgbClr val="000000"/>
-                </a:solidFill>
-                <a:latin typeface="Menlo"/>
-              </a:rPr>
-              <a:t>true)</a:t>
+              <a:t>, true)</a:t>
             </a:r>
             <a:r>
               <a:rPr lang="en-US" sz="1500" dirty="0" smtClean="0">
@@ -13676,7 +13671,7 @@
       </p:grpSpPr>
       <p:sp>
         <p:nvSpPr>
-          <p:cNvPr id="2" name="Title 1"/>
+          <p:cNvPr id="5" name="Title 4"/>
           <p:cNvSpPr>
             <a:spLocks noGrp="1"/>
           </p:cNvSpPr>
@@ -13691,7 +13686,11 @@
           <a:p>
             <a:r>
               <a:rPr lang="en-US" dirty="0" smtClean="0"/>
-              <a:t>More API features</a:t>
+              <a:t>Connecting to Apache </a:t>
+            </a:r>
+            <a:r>
+              <a:rPr lang="en-US" dirty="0" smtClean="0"/>
+              <a:t>Kafka</a:t>
             </a:r>
             <a:endParaRPr lang="en-US" dirty="0"/>
           </a:p>
@@ -13699,7 +13698,7 @@
       </p:sp>
       <p:sp>
         <p:nvSpPr>
-          <p:cNvPr id="3" name="Text Placeholder 2"/>
+          <p:cNvPr id="6" name="Text Placeholder 5"/>
           <p:cNvSpPr>
             <a:spLocks noGrp="1"/>
           </p:cNvSpPr>
@@ -13732,24 +13731,44 @@
           <a:lstStyle/>
           <a:p>
             <a:fld id="{B07C5D84-2227-C144-B485-A8CA33CE4230}" type="slidenum">
-              <a:rPr lang="en-US" smtClean="0"/>
+              <a:rPr lang="en-US" smtClean="0">
+                <a:solidFill>
+                  <a:prstClr val="black">
+                    <a:tint val="75000"/>
+                  </a:prstClr>
+                </a:solidFill>
+              </a:rPr>
               <a:pPr/>
               <a:t>31</a:t>
             </a:fld>
-            <a:endParaRPr lang="en-US"/>
+            <a:endParaRPr lang="en-US">
+              <a:solidFill>
+                <a:prstClr val="black">
+                  <a:tint val="75000"/>
+                </a:prstClr>
+              </a:solidFill>
+            </a:endParaRPr>
           </a:p>
         </p:txBody>
       </p:sp>
     </p:spTree>
     <p:extLst>
       <p:ext uri="{BB962C8B-B14F-4D97-AF65-F5344CB8AC3E}">
-        <p14:creationId xmlns:p14="http://schemas.microsoft.com/office/powerpoint/2010/main" val="1460006872"/>
+        <p14:creationId xmlns:p14="http://schemas.microsoft.com/office/powerpoint/2010/main" val="4144955118"/>
       </p:ext>
     </p:extLst>
   </p:cSld>
   <p:clrMapOvr>
     <a:masterClrMapping/>
   </p:clrMapOvr>
+  <mc:AlternateContent xmlns:mc="http://schemas.openxmlformats.org/markup-compatibility/2006" xmlns:p14="http://schemas.microsoft.com/office/powerpoint/2010/main">
+    <mc:Choice Requires="p14">
+      <p:transition spd="slow" p14:dur="2000"/>
+    </mc:Choice>
+    <mc:Fallback xmlns="">
+      <p:transition xmlns:p14="http://schemas.microsoft.com/office/powerpoint/2010/main" spd="slow"/>
+    </mc:Fallback>
+  </mc:AlternateContent>
   <p:timing>
     <p:tnLst>
       <p:par>
@@ -13794,7 +13813,11 @@
           <a:p>
             <a:r>
               <a:rPr lang="en-US" dirty="0" smtClean="0"/>
-              <a:t>Not covered here</a:t>
+              <a:t>Kafka and </a:t>
+            </a:r>
+            <a:r>
+              <a:rPr lang="en-US" dirty="0" err="1" smtClean="0"/>
+              <a:t>Flink</a:t>
             </a:r>
             <a:endParaRPr lang="en-US" dirty="0"/>
           </a:p>
@@ -13802,7 +13825,7 @@
       </p:sp>
       <p:sp>
         <p:nvSpPr>
-          <p:cNvPr id="6" name="Content Placeholder 5"/>
+          <p:cNvPr id="8" name="Content Placeholder 7"/>
           <p:cNvSpPr>
             <a:spLocks noGrp="1"/>
           </p:cNvSpPr>
@@ -13812,37 +13835,70 @@
         </p:nvSpPr>
         <p:spPr/>
         <p:txBody>
-          <a:bodyPr/>
+          <a:bodyPr>
+            <a:normAutofit fontScale="77500" lnSpcReduction="20000"/>
+          </a:bodyPr>
           <a:lstStyle/>
           <a:p>
             <a:r>
               <a:rPr lang="en-US" dirty="0" smtClean="0"/>
-              <a:t>Iterations (feedback edges)</a:t>
-            </a:r>
-          </a:p>
-          <a:p>
-            <a:pPr lvl="1"/>
+              <a:t>“Apache Kafka is a distributed, partitioned, replicated commit log service”</a:t>
+            </a:r>
+          </a:p>
+          <a:p>
+            <a:pPr lvl="6"/>
+            <a:endParaRPr lang="en-US" dirty="0" smtClean="0"/>
+          </a:p>
+          <a:p>
             <a:r>
               <a:rPr lang="en-US" dirty="0" smtClean="0"/>
-              <a:t>Very useful for Machine Learning</a:t>
-            </a:r>
-          </a:p>
-          <a:p>
-            <a:pPr lvl="7"/>
+              <a:t>Kafka uses Apache Zookeeper for coordination</a:t>
+            </a:r>
+          </a:p>
+          <a:p>
+            <a:pPr lvl="5"/>
             <a:endParaRPr lang="en-US" dirty="0" smtClean="0"/>
           </a:p>
           <a:p>
             <a:r>
               <a:rPr lang="en-US" dirty="0" smtClean="0"/>
-              <a:t>More transformations</a:t>
-            </a:r>
-          </a:p>
-          <a:p>
-            <a:pPr lvl="1"/>
+              <a:t>Kafka maintains feeds of messages in categories called topics</a:t>
+            </a:r>
+          </a:p>
+          <a:p>
+            <a:pPr lvl="5"/>
+            <a:endParaRPr lang="en-US" dirty="0" smtClean="0"/>
+          </a:p>
+          <a:p>
             <a:r>
               <a:rPr lang="en-US" dirty="0" smtClean="0"/>
-              <a:t>union, join, ...</a:t>
-            </a:r>
+              <a:t>A Kafka topic can be read by </a:t>
+            </a:r>
+            <a:r>
+              <a:rPr lang="en-US" dirty="0" err="1" smtClean="0"/>
+              <a:t>Flink</a:t>
+            </a:r>
+            <a:r>
+              <a:rPr lang="en-US" dirty="0" smtClean="0"/>
+              <a:t> to produce a DataStream, and a DataStream can be written to a Kafka topic</a:t>
+            </a:r>
+          </a:p>
+          <a:p>
+            <a:pPr lvl="4"/>
+            <a:endParaRPr lang="en-US" dirty="0"/>
+          </a:p>
+          <a:p>
+            <a:r>
+              <a:rPr lang="en-US" dirty="0" err="1" smtClean="0"/>
+              <a:t>Flink</a:t>
+            </a:r>
+            <a:r>
+              <a:rPr lang="en-US" dirty="0" smtClean="0"/>
+              <a:t> coordinates with Kafka to provide recovery in the case of failures</a:t>
+            </a:r>
+            <a:endParaRPr lang="en-US" dirty="0"/>
+          </a:p>
+          <a:p>
             <a:endParaRPr lang="en-US" dirty="0"/>
           </a:p>
         </p:txBody>
@@ -13874,7 +13930,7 @@
     </p:spTree>
     <p:extLst>
       <p:ext uri="{BB962C8B-B14F-4D97-AF65-F5344CB8AC3E}">
-        <p14:creationId xmlns:p14="http://schemas.microsoft.com/office/powerpoint/2010/main" val="1529586904"/>
+        <p14:creationId xmlns:p14="http://schemas.microsoft.com/office/powerpoint/2010/main" val="186259580"/>
       </p:ext>
     </p:extLst>
   </p:cSld>
@@ -13923,6 +13979,1196 @@
           <a:bodyPr/>
           <a:lstStyle/>
           <a:p>
+            <a:r>
+              <a:rPr lang="en-US" dirty="0" smtClean="0"/>
+              <a:t>Reading data </a:t>
+            </a:r>
+            <a:r>
+              <a:rPr lang="en-US" smtClean="0"/>
+              <a:t>from Kafka</a:t>
+            </a:r>
+            <a:endParaRPr lang="en-US"/>
+          </a:p>
+        </p:txBody>
+      </p:sp>
+      <p:sp>
+        <p:nvSpPr>
+          <p:cNvPr id="3" name="Content Placeholder 2"/>
+          <p:cNvSpPr>
+            <a:spLocks noGrp="1"/>
+          </p:cNvSpPr>
+          <p:nvPr>
+            <p:ph idx="1"/>
+          </p:nvPr>
+        </p:nvSpPr>
+        <p:spPr>
+          <a:xfrm>
+            <a:off x="457200" y="1474376"/>
+            <a:ext cx="8229600" cy="4962424"/>
+          </a:xfrm>
+        </p:spPr>
+        <p:txBody>
+          <a:bodyPr>
+            <a:normAutofit fontScale="62500" lnSpcReduction="20000"/>
+          </a:bodyPr>
+          <a:lstStyle/>
+          <a:p>
+            <a:r>
+              <a:rPr lang="en-US" sz="3800" dirty="0" smtClean="0"/>
+              <a:t>Enable </a:t>
+            </a:r>
+            <a:r>
+              <a:rPr lang="en-US" sz="3800" dirty="0" err="1" smtClean="0"/>
+              <a:t>checkpointing</a:t>
+            </a:r>
+            <a:endParaRPr lang="en-US" sz="3800" dirty="0" smtClean="0"/>
+          </a:p>
+          <a:p>
+            <a:pPr marL="457200" lvl="1" indent="0">
+              <a:buNone/>
+            </a:pPr>
+            <a:r>
+              <a:rPr lang="en-US" dirty="0" smtClean="0"/>
+              <a:t>E.g., </a:t>
+            </a:r>
+            <a:r>
+              <a:rPr lang="en-US" sz="2900" dirty="0" err="1" smtClean="0">
+                <a:latin typeface="Menlo Regular"/>
+                <a:cs typeface="Menlo Regular"/>
+              </a:rPr>
+              <a:t>env.enableCheckpointing</a:t>
+            </a:r>
+            <a:r>
+              <a:rPr lang="en-US" sz="2900" dirty="0" smtClean="0">
+                <a:latin typeface="Menlo Regular"/>
+                <a:cs typeface="Menlo Regular"/>
+              </a:rPr>
+              <a:t>(</a:t>
+            </a:r>
+            <a:r>
+              <a:rPr lang="en-US" sz="2900" dirty="0" smtClean="0">
+                <a:solidFill>
+                  <a:srgbClr val="0000FF"/>
+                </a:solidFill>
+                <a:latin typeface="Menlo Regular"/>
+                <a:cs typeface="Menlo Regular"/>
+              </a:rPr>
+              <a:t>5000</a:t>
+            </a:r>
+            <a:r>
+              <a:rPr lang="en-US" sz="2900" dirty="0" smtClean="0">
+                <a:latin typeface="Menlo Regular"/>
+                <a:cs typeface="Menlo Regular"/>
+              </a:rPr>
+              <a:t>)</a:t>
+            </a:r>
+            <a:r>
+              <a:rPr lang="en-US" sz="2900" dirty="0" smtClean="0"/>
+              <a:t>;</a:t>
+            </a:r>
+          </a:p>
+          <a:p>
+            <a:endParaRPr lang="en-US" sz="3800" dirty="0" smtClean="0"/>
+          </a:p>
+          <a:p>
+            <a:r>
+              <a:rPr lang="en-US" sz="3800" dirty="0" smtClean="0"/>
+              <a:t>Add a DataStream source from a Kafka topic</a:t>
+            </a:r>
+            <a:endParaRPr lang="en-US" sz="3800" dirty="0" smtClean="0">
+              <a:latin typeface="Menlo Regular"/>
+              <a:cs typeface="Menlo Regular"/>
+            </a:endParaRPr>
+          </a:p>
+          <a:p>
+            <a:pPr marL="0" indent="0">
+              <a:buNone/>
+            </a:pPr>
+            <a:endParaRPr lang="en-US" dirty="0" smtClean="0"/>
+          </a:p>
+          <a:p>
+            <a:pPr marL="0" indent="0">
+              <a:buNone/>
+            </a:pPr>
+            <a:r>
+              <a:rPr lang="en-US" sz="2900" dirty="0" smtClean="0">
+                <a:latin typeface="Menlo Regular"/>
+                <a:cs typeface="Menlo Regular"/>
+              </a:rPr>
+              <a:t>Properties props </a:t>
+            </a:r>
+            <a:r>
+              <a:rPr lang="en-US" sz="2900" dirty="0">
+                <a:latin typeface="Menlo Regular"/>
+                <a:cs typeface="Menlo Regular"/>
+              </a:rPr>
+              <a:t>= </a:t>
+            </a:r>
+            <a:r>
+              <a:rPr lang="en-US" sz="3000" b="1" dirty="0">
+                <a:solidFill>
+                  <a:srgbClr val="000090"/>
+                </a:solidFill>
+                <a:latin typeface="Menlo Regular"/>
+                <a:cs typeface="Menlo Regular"/>
+              </a:rPr>
+              <a:t>new</a:t>
+            </a:r>
+            <a:r>
+              <a:rPr lang="en-US" sz="2900" dirty="0">
+                <a:latin typeface="Menlo Regular"/>
+                <a:cs typeface="Menlo Regular"/>
+              </a:rPr>
+              <a:t> Properties()</a:t>
+            </a:r>
+            <a:r>
+              <a:rPr lang="en-US" sz="2900" dirty="0" smtClean="0">
+                <a:latin typeface="Menlo Regular"/>
+                <a:cs typeface="Menlo Regular"/>
+              </a:rPr>
+              <a:t>;</a:t>
+            </a:r>
+          </a:p>
+          <a:p>
+            <a:pPr marL="0" indent="0">
+              <a:buNone/>
+            </a:pPr>
+            <a:r>
+              <a:rPr lang="en-US" sz="2900" dirty="0" err="1" smtClean="0">
+                <a:latin typeface="Menlo Regular"/>
+                <a:cs typeface="Menlo Regular"/>
+              </a:rPr>
+              <a:t>props.setProperty</a:t>
+            </a:r>
+            <a:r>
+              <a:rPr lang="en-US" sz="2900" dirty="0">
+                <a:latin typeface="Menlo Regular"/>
+                <a:cs typeface="Menlo Regular"/>
+              </a:rPr>
+              <a:t>(</a:t>
+            </a:r>
+            <a:r>
+              <a:rPr lang="en-US" sz="2900" b="1" dirty="0">
+                <a:solidFill>
+                  <a:srgbClr val="008000"/>
+                </a:solidFill>
+                <a:latin typeface="Menlo"/>
+              </a:rPr>
+              <a:t>"</a:t>
+            </a:r>
+            <a:r>
+              <a:rPr lang="en-US" sz="2900" b="1" dirty="0" err="1">
+                <a:solidFill>
+                  <a:srgbClr val="008000"/>
+                </a:solidFill>
+                <a:latin typeface="Menlo"/>
+              </a:rPr>
+              <a:t>zookeeper.connect</a:t>
+            </a:r>
+            <a:r>
+              <a:rPr lang="en-US" sz="2900" b="1" dirty="0">
+                <a:solidFill>
+                  <a:srgbClr val="008000"/>
+                </a:solidFill>
+                <a:latin typeface="Menlo"/>
+              </a:rPr>
+              <a:t>"</a:t>
+            </a:r>
+            <a:r>
+              <a:rPr lang="en-US" sz="2900" dirty="0">
+                <a:latin typeface="Menlo Regular"/>
+                <a:cs typeface="Menlo Regular"/>
+              </a:rPr>
+              <a:t>, </a:t>
+            </a:r>
+            <a:r>
+              <a:rPr lang="en-US" sz="2900" b="1" dirty="0">
+                <a:solidFill>
+                  <a:srgbClr val="008000"/>
+                </a:solidFill>
+                <a:latin typeface="Menlo"/>
+              </a:rPr>
+              <a:t>“localhost:2181”</a:t>
+            </a:r>
+            <a:r>
+              <a:rPr lang="en-US" sz="2900" dirty="0" smtClean="0">
+                <a:latin typeface="Menlo Regular"/>
+                <a:cs typeface="Menlo Regular"/>
+              </a:rPr>
+              <a:t>);</a:t>
+            </a:r>
+          </a:p>
+          <a:p>
+            <a:pPr marL="0" indent="0">
+              <a:buNone/>
+            </a:pPr>
+            <a:r>
+              <a:rPr lang="en-US" sz="2900" dirty="0" err="1" smtClean="0">
+                <a:latin typeface="Menlo Regular"/>
+                <a:cs typeface="Menlo Regular"/>
+              </a:rPr>
+              <a:t>props.setProperty</a:t>
+            </a:r>
+            <a:r>
+              <a:rPr lang="en-US" sz="2900" dirty="0">
+                <a:latin typeface="Menlo Regular"/>
+                <a:cs typeface="Menlo Regular"/>
+              </a:rPr>
+              <a:t>(</a:t>
+            </a:r>
+            <a:r>
+              <a:rPr lang="en-US" sz="2900" b="1" dirty="0">
+                <a:solidFill>
+                  <a:srgbClr val="008000"/>
+                </a:solidFill>
+                <a:latin typeface="Menlo"/>
+              </a:rPr>
+              <a:t>"</a:t>
+            </a:r>
+            <a:r>
+              <a:rPr lang="en-US" sz="2900" b="1" dirty="0" err="1">
+                <a:solidFill>
+                  <a:srgbClr val="008000"/>
+                </a:solidFill>
+                <a:latin typeface="Menlo"/>
+              </a:rPr>
+              <a:t>bootstrap.servers</a:t>
+            </a:r>
+            <a:r>
+              <a:rPr lang="en-US" sz="2900" b="1" dirty="0">
+                <a:solidFill>
+                  <a:srgbClr val="008000"/>
+                </a:solidFill>
+                <a:latin typeface="Menlo"/>
+              </a:rPr>
+              <a:t>"</a:t>
+            </a:r>
+            <a:r>
+              <a:rPr lang="en-US" sz="2900" dirty="0">
+                <a:latin typeface="Menlo Regular"/>
+                <a:cs typeface="Menlo Regular"/>
+              </a:rPr>
+              <a:t>, </a:t>
+            </a:r>
+            <a:r>
+              <a:rPr lang="en-US" sz="2900" b="1" dirty="0">
+                <a:solidFill>
+                  <a:srgbClr val="008000"/>
+                </a:solidFill>
+                <a:latin typeface="Menlo"/>
+              </a:rPr>
+              <a:t>“localhost:9092”</a:t>
+            </a:r>
+            <a:r>
+              <a:rPr lang="en-US" sz="2900" dirty="0" smtClean="0">
+                <a:latin typeface="Menlo Regular"/>
+                <a:cs typeface="Menlo Regular"/>
+              </a:rPr>
+              <a:t>);</a:t>
+            </a:r>
+          </a:p>
+          <a:p>
+            <a:pPr marL="0" indent="0">
+              <a:buNone/>
+            </a:pPr>
+            <a:r>
+              <a:rPr lang="en-US" sz="2900" dirty="0" err="1" smtClean="0">
+                <a:latin typeface="Menlo Regular"/>
+                <a:cs typeface="Menlo Regular"/>
+              </a:rPr>
+              <a:t>props.setProperty</a:t>
+            </a:r>
+            <a:r>
+              <a:rPr lang="en-US" sz="2900" dirty="0">
+                <a:latin typeface="Menlo Regular"/>
+                <a:cs typeface="Menlo Regular"/>
+              </a:rPr>
+              <a:t>(</a:t>
+            </a:r>
+            <a:r>
+              <a:rPr lang="en-US" sz="2900" b="1" dirty="0">
+                <a:solidFill>
+                  <a:srgbClr val="008000"/>
+                </a:solidFill>
+                <a:latin typeface="Menlo"/>
+              </a:rPr>
+              <a:t>"</a:t>
+            </a:r>
+            <a:r>
+              <a:rPr lang="en-US" sz="2900" b="1" dirty="0" err="1">
+                <a:solidFill>
+                  <a:srgbClr val="008000"/>
+                </a:solidFill>
+                <a:latin typeface="Menlo"/>
+              </a:rPr>
+              <a:t>group.id</a:t>
+            </a:r>
+            <a:r>
+              <a:rPr lang="en-US" sz="2900" b="1" dirty="0">
+                <a:solidFill>
+                  <a:srgbClr val="008000"/>
+                </a:solidFill>
+                <a:latin typeface="Menlo"/>
+              </a:rPr>
+              <a:t>"</a:t>
+            </a:r>
+            <a:r>
+              <a:rPr lang="en-US" sz="2900" dirty="0">
+                <a:latin typeface="Menlo Regular"/>
+                <a:cs typeface="Menlo Regular"/>
+              </a:rPr>
+              <a:t>, </a:t>
+            </a:r>
+            <a:r>
+              <a:rPr lang="en-US" sz="2900" b="1" dirty="0">
+                <a:solidFill>
+                  <a:srgbClr val="008000"/>
+                </a:solidFill>
+                <a:latin typeface="Menlo"/>
+              </a:rPr>
+              <a:t>“</a:t>
+            </a:r>
+            <a:r>
+              <a:rPr lang="en-US" sz="2900" b="1" dirty="0" err="1">
+                <a:solidFill>
+                  <a:srgbClr val="008000"/>
+                </a:solidFill>
+                <a:latin typeface="Menlo"/>
+              </a:rPr>
+              <a:t>myGroup</a:t>
+            </a:r>
+            <a:r>
+              <a:rPr lang="en-US" sz="2900" b="1" dirty="0">
+                <a:solidFill>
+                  <a:srgbClr val="008000"/>
+                </a:solidFill>
+                <a:latin typeface="Menlo"/>
+              </a:rPr>
+              <a:t>”</a:t>
+            </a:r>
+            <a:r>
+              <a:rPr lang="en-US" sz="2900" dirty="0" smtClean="0">
+                <a:latin typeface="Menlo Regular"/>
+                <a:cs typeface="Menlo Regular"/>
+              </a:rPr>
+              <a:t>)</a:t>
+            </a:r>
+            <a:r>
+              <a:rPr lang="en-US" sz="2900" dirty="0">
+                <a:latin typeface="Menlo Regular"/>
+                <a:cs typeface="Menlo Regular"/>
+              </a:rPr>
+              <a:t>;</a:t>
+            </a:r>
+            <a:br>
+              <a:rPr lang="en-US" sz="2900" dirty="0">
+                <a:latin typeface="Menlo Regular"/>
+                <a:cs typeface="Menlo Regular"/>
+              </a:rPr>
+            </a:br>
+            <a:r>
+              <a:rPr lang="en-US" sz="2900" dirty="0">
+                <a:latin typeface="Menlo Regular"/>
+                <a:cs typeface="Menlo Regular"/>
+              </a:rPr>
+              <a:t/>
+            </a:r>
+            <a:br>
+              <a:rPr lang="en-US" sz="2900" dirty="0">
+                <a:latin typeface="Menlo Regular"/>
+                <a:cs typeface="Menlo Regular"/>
+              </a:rPr>
+            </a:br>
+            <a:r>
+              <a:rPr lang="en-US" sz="2900" dirty="0">
+                <a:latin typeface="Menlo Regular"/>
+                <a:cs typeface="Menlo Regular"/>
+              </a:rPr>
+              <a:t>// create a data </a:t>
+            </a:r>
+            <a:r>
+              <a:rPr lang="en-US" sz="2900" dirty="0" smtClean="0">
+                <a:latin typeface="Menlo Regular"/>
+                <a:cs typeface="Menlo Regular"/>
+              </a:rPr>
+              <a:t>source</a:t>
+            </a:r>
+            <a:br>
+              <a:rPr lang="en-US" sz="2900" dirty="0" smtClean="0">
+                <a:latin typeface="Menlo Regular"/>
+                <a:cs typeface="Menlo Regular"/>
+              </a:rPr>
+            </a:br>
+            <a:r>
+              <a:rPr lang="en-US" sz="2900" dirty="0" smtClean="0">
+                <a:latin typeface="Menlo Regular"/>
+                <a:cs typeface="Menlo Regular"/>
+              </a:rPr>
+              <a:t>DataStream</a:t>
+            </a:r>
+            <a:r>
+              <a:rPr lang="en-US" sz="2900" dirty="0">
+                <a:latin typeface="Menlo Regular"/>
+                <a:cs typeface="Menlo Regular"/>
+              </a:rPr>
+              <a:t>&lt;</a:t>
+            </a:r>
+            <a:r>
+              <a:rPr lang="en-US" sz="2900" dirty="0" err="1">
+                <a:latin typeface="Menlo Regular"/>
+                <a:cs typeface="Menlo Regular"/>
+              </a:rPr>
+              <a:t>TaxiRide</a:t>
+            </a:r>
+            <a:r>
+              <a:rPr lang="en-US" sz="2900" dirty="0">
+                <a:latin typeface="Menlo Regular"/>
+                <a:cs typeface="Menlo Regular"/>
+              </a:rPr>
+              <a:t>&gt; rides </a:t>
+            </a:r>
+            <a:r>
+              <a:rPr lang="en-US" sz="2900" dirty="0" smtClean="0">
+                <a:latin typeface="Menlo Regular"/>
+                <a:cs typeface="Menlo Regular"/>
+              </a:rPr>
+              <a:t>=</a:t>
+            </a:r>
+            <a:r>
+              <a:rPr lang="en-US" sz="2900" dirty="0">
+                <a:latin typeface="Menlo Regular"/>
+                <a:cs typeface="Menlo Regular"/>
+              </a:rPr>
+              <a:t> </a:t>
+            </a:r>
+            <a:r>
+              <a:rPr lang="en-US" sz="2900" dirty="0" err="1" smtClean="0">
+                <a:latin typeface="Menlo Regular"/>
+                <a:cs typeface="Menlo Regular"/>
+              </a:rPr>
+              <a:t>env.addSource</a:t>
+            </a:r>
+            <a:r>
+              <a:rPr lang="en-US" sz="2900" dirty="0" smtClean="0">
+                <a:latin typeface="Menlo Regular"/>
+                <a:cs typeface="Menlo Regular"/>
+              </a:rPr>
+              <a:t>(</a:t>
+            </a:r>
+          </a:p>
+          <a:p>
+            <a:pPr marL="0" indent="0">
+              <a:buNone/>
+            </a:pPr>
+            <a:r>
+              <a:rPr lang="en-US" sz="2900" dirty="0">
+                <a:latin typeface="Menlo Regular"/>
+                <a:cs typeface="Menlo Regular"/>
+              </a:rPr>
+              <a:t>		</a:t>
+            </a:r>
+            <a:r>
+              <a:rPr lang="en-US" sz="3000" b="1" dirty="0">
+                <a:solidFill>
+                  <a:srgbClr val="000090"/>
+                </a:solidFill>
+                <a:latin typeface="Menlo Regular"/>
+                <a:cs typeface="Menlo Regular"/>
+              </a:rPr>
+              <a:t>new</a:t>
+            </a:r>
+            <a:r>
+              <a:rPr lang="en-US" sz="2900" dirty="0" smtClean="0">
+                <a:latin typeface="Menlo Regular"/>
+                <a:cs typeface="Menlo Regular"/>
+              </a:rPr>
+              <a:t> </a:t>
+            </a:r>
+            <a:r>
+              <a:rPr lang="en-US" sz="2900" dirty="0">
+                <a:latin typeface="Menlo Regular"/>
+                <a:cs typeface="Menlo Regular"/>
+              </a:rPr>
+              <a:t>FlinkKafkaConsumer082&lt;</a:t>
+            </a:r>
+            <a:r>
+              <a:rPr lang="en-US" sz="2900" dirty="0" err="1">
+                <a:latin typeface="Menlo Regular"/>
+                <a:cs typeface="Menlo Regular"/>
+              </a:rPr>
+              <a:t>TaxiRide</a:t>
+            </a:r>
+            <a:r>
+              <a:rPr lang="en-US" sz="2900" dirty="0">
+                <a:latin typeface="Menlo Regular"/>
+                <a:cs typeface="Menlo Regular"/>
+              </a:rPr>
+              <a:t>&gt;(</a:t>
+            </a:r>
+            <a:br>
+              <a:rPr lang="en-US" sz="2900" dirty="0">
+                <a:latin typeface="Menlo Regular"/>
+                <a:cs typeface="Menlo Regular"/>
+              </a:rPr>
+            </a:br>
+            <a:r>
+              <a:rPr lang="en-US" sz="2900" dirty="0">
+                <a:latin typeface="Menlo Regular"/>
+                <a:cs typeface="Menlo Regular"/>
+              </a:rPr>
+              <a:t>               </a:t>
+            </a:r>
+            <a:r>
+              <a:rPr lang="en-US" sz="2900" b="1" dirty="0">
+                <a:solidFill>
+                  <a:srgbClr val="008000"/>
+                </a:solidFill>
+                <a:latin typeface="Menlo"/>
+              </a:rPr>
+              <a:t>“</a:t>
+            </a:r>
+            <a:r>
+              <a:rPr lang="en-US" sz="2900" b="1" dirty="0" err="1">
+                <a:solidFill>
+                  <a:srgbClr val="008000"/>
+                </a:solidFill>
+                <a:latin typeface="Menlo"/>
+              </a:rPr>
+              <a:t>myTopic</a:t>
+            </a:r>
+            <a:r>
+              <a:rPr lang="en-US" sz="2900" b="1" dirty="0">
+                <a:solidFill>
+                  <a:srgbClr val="008000"/>
+                </a:solidFill>
+                <a:latin typeface="Menlo"/>
+              </a:rPr>
+              <a:t>”</a:t>
+            </a:r>
+            <a:r>
+              <a:rPr lang="en-US" sz="2900" dirty="0" smtClean="0">
+                <a:latin typeface="Menlo Regular"/>
+                <a:cs typeface="Menlo Regular"/>
+              </a:rPr>
+              <a:t>,</a:t>
+            </a:r>
+            <a:r>
+              <a:rPr lang="en-US" sz="2900" dirty="0">
+                <a:latin typeface="Menlo Regular"/>
+                <a:cs typeface="Menlo Regular"/>
+              </a:rPr>
+              <a:t/>
+            </a:r>
+            <a:br>
+              <a:rPr lang="en-US" sz="2900" dirty="0">
+                <a:latin typeface="Menlo Regular"/>
+                <a:cs typeface="Menlo Regular"/>
+              </a:rPr>
+            </a:br>
+            <a:r>
+              <a:rPr lang="en-US" sz="2900" dirty="0">
+                <a:latin typeface="Menlo Regular"/>
+                <a:cs typeface="Menlo Regular"/>
+              </a:rPr>
+              <a:t>               </a:t>
+            </a:r>
+            <a:r>
+              <a:rPr lang="en-US" sz="3000" b="1" dirty="0">
+                <a:solidFill>
+                  <a:srgbClr val="000090"/>
+                </a:solidFill>
+                <a:latin typeface="Menlo Regular"/>
+                <a:cs typeface="Menlo Regular"/>
+              </a:rPr>
+              <a:t>new</a:t>
+            </a:r>
+            <a:r>
+              <a:rPr lang="en-US" sz="2900" dirty="0">
+                <a:latin typeface="Menlo Regular"/>
+                <a:cs typeface="Menlo Regular"/>
+              </a:rPr>
+              <a:t> </a:t>
+            </a:r>
+            <a:r>
+              <a:rPr lang="en-US" sz="2900" dirty="0" err="1">
+                <a:latin typeface="Menlo Regular"/>
+                <a:cs typeface="Menlo Regular"/>
+              </a:rPr>
+              <a:t>TaxiRideSchema</a:t>
+            </a:r>
+            <a:r>
+              <a:rPr lang="en-US" sz="2900" dirty="0">
+                <a:latin typeface="Menlo Regular"/>
+                <a:cs typeface="Menlo Regular"/>
+              </a:rPr>
+              <a:t>(),</a:t>
+            </a:r>
+            <a:br>
+              <a:rPr lang="en-US" sz="2900" dirty="0">
+                <a:latin typeface="Menlo Regular"/>
+                <a:cs typeface="Menlo Regular"/>
+              </a:rPr>
+            </a:br>
+            <a:r>
+              <a:rPr lang="en-US" sz="2900" dirty="0">
+                <a:latin typeface="Menlo Regular"/>
+                <a:cs typeface="Menlo Regular"/>
+              </a:rPr>
+              <a:t>               </a:t>
+            </a:r>
+            <a:r>
+              <a:rPr lang="en-US" sz="2900" dirty="0" smtClean="0">
+                <a:latin typeface="Menlo Regular"/>
+                <a:cs typeface="Menlo Regular"/>
+              </a:rPr>
+              <a:t>props</a:t>
+            </a:r>
+            <a:r>
+              <a:rPr lang="en-US" sz="2900" dirty="0">
+                <a:latin typeface="Menlo Regular"/>
+                <a:cs typeface="Menlo Regular"/>
+              </a:rPr>
+              <a:t>)</a:t>
+            </a:r>
+            <a:br>
+              <a:rPr lang="en-US" sz="2900" dirty="0">
+                <a:latin typeface="Menlo Regular"/>
+                <a:cs typeface="Menlo Regular"/>
+              </a:rPr>
+            </a:br>
+            <a:r>
+              <a:rPr lang="en-US" sz="2900" dirty="0" smtClean="0">
+                <a:latin typeface="Menlo Regular"/>
+                <a:cs typeface="Menlo Regular"/>
+              </a:rPr>
+              <a:t>	</a:t>
+            </a:r>
+            <a:r>
+              <a:rPr lang="en-US" sz="2900" dirty="0">
+                <a:latin typeface="Menlo Regular"/>
+                <a:cs typeface="Menlo Regular"/>
+              </a:rPr>
+              <a:t>	</a:t>
+            </a:r>
+            <a:r>
+              <a:rPr lang="en-US" sz="2900" dirty="0" smtClean="0">
+                <a:latin typeface="Menlo Regular"/>
+                <a:cs typeface="Menlo Regular"/>
+              </a:rPr>
+              <a:t>);</a:t>
+            </a:r>
+          </a:p>
+        </p:txBody>
+      </p:sp>
+      <p:sp>
+        <p:nvSpPr>
+          <p:cNvPr id="4" name="Slide Number Placeholder 3"/>
+          <p:cNvSpPr>
+            <a:spLocks noGrp="1"/>
+          </p:cNvSpPr>
+          <p:nvPr>
+            <p:ph type="sldNum" sz="quarter" idx="12"/>
+          </p:nvPr>
+        </p:nvSpPr>
+        <p:spPr/>
+        <p:txBody>
+          <a:bodyPr/>
+          <a:lstStyle/>
+          <a:p>
+            <a:fld id="{B07C5D84-2227-C144-B485-A8CA33CE4230}" type="slidenum">
+              <a:rPr lang="en-US" smtClean="0">
+                <a:solidFill>
+                  <a:prstClr val="black">
+                    <a:tint val="75000"/>
+                  </a:prstClr>
+                </a:solidFill>
+              </a:rPr>
+              <a:pPr/>
+              <a:t>33</a:t>
+            </a:fld>
+            <a:endParaRPr lang="en-US">
+              <a:solidFill>
+                <a:prstClr val="black">
+                  <a:tint val="75000"/>
+                </a:prstClr>
+              </a:solidFill>
+            </a:endParaRPr>
+          </a:p>
+        </p:txBody>
+      </p:sp>
+    </p:spTree>
+    <p:extLst>
+      <p:ext uri="{BB962C8B-B14F-4D97-AF65-F5344CB8AC3E}">
+        <p14:creationId xmlns:p14="http://schemas.microsoft.com/office/powerpoint/2010/main" val="3819950122"/>
+      </p:ext>
+    </p:extLst>
+  </p:cSld>
+  <p:clrMapOvr>
+    <a:masterClrMapping/>
+  </p:clrMapOvr>
+  <p:timing>
+    <p:tnLst>
+      <p:par>
+        <p:cTn xmlns:p14="http://schemas.microsoft.com/office/powerpoint/2010/main" id="1" dur="indefinite" restart="never" nodeType="tmRoot"/>
+      </p:par>
+    </p:tnLst>
+  </p:timing>
+</p:sld>
+</file>
+
+<file path=ppt/slides/slide34.xml><?xml version="1.0" encoding="utf-8"?>
+<p:sld xmlns:a="http://schemas.openxmlformats.org/drawingml/2006/main" xmlns:r="http://schemas.openxmlformats.org/officeDocument/2006/relationships" xmlns:p="http://schemas.openxmlformats.org/presentationml/2006/main">
+  <p:cSld>
+    <p:spTree>
+      <p:nvGrpSpPr>
+        <p:cNvPr id="1" name=""/>
+        <p:cNvGrpSpPr/>
+        <p:nvPr/>
+      </p:nvGrpSpPr>
+      <p:grpSpPr>
+        <a:xfrm>
+          <a:off x="0" y="0"/>
+          <a:ext cx="0" cy="0"/>
+          <a:chOff x="0" y="0"/>
+          <a:chExt cx="0" cy="0"/>
+        </a:xfrm>
+      </p:grpSpPr>
+      <p:sp>
+        <p:nvSpPr>
+          <p:cNvPr id="2" name="Title 1"/>
+          <p:cNvSpPr>
+            <a:spLocks noGrp="1"/>
+          </p:cNvSpPr>
+          <p:nvPr>
+            <p:ph type="title"/>
+          </p:nvPr>
+        </p:nvSpPr>
+        <p:spPr/>
+        <p:txBody>
+          <a:bodyPr/>
+          <a:lstStyle/>
+          <a:p>
+            <a:r>
+              <a:rPr lang="en-US" dirty="0" smtClean="0"/>
+              <a:t>Writing data to Kafka</a:t>
+            </a:r>
+            <a:endParaRPr lang="en-US" dirty="0"/>
+          </a:p>
+        </p:txBody>
+      </p:sp>
+      <p:sp>
+        <p:nvSpPr>
+          <p:cNvPr id="3" name="Content Placeholder 2"/>
+          <p:cNvSpPr>
+            <a:spLocks noGrp="1"/>
+          </p:cNvSpPr>
+          <p:nvPr>
+            <p:ph idx="1"/>
+          </p:nvPr>
+        </p:nvSpPr>
+        <p:spPr/>
+        <p:txBody>
+          <a:bodyPr>
+            <a:normAutofit fontScale="92500" lnSpcReduction="10000"/>
+          </a:bodyPr>
+          <a:lstStyle/>
+          <a:p>
+            <a:r>
+              <a:rPr lang="en-US" dirty="0" smtClean="0"/>
+              <a:t>Add a Kafka sink to a DataStream by providing</a:t>
+            </a:r>
+          </a:p>
+          <a:p>
+            <a:pPr lvl="1"/>
+            <a:r>
+              <a:rPr lang="en-US" dirty="0" smtClean="0"/>
+              <a:t>The broker address</a:t>
+            </a:r>
+          </a:p>
+          <a:p>
+            <a:pPr lvl="1"/>
+            <a:r>
+              <a:rPr lang="en-US" dirty="0" smtClean="0"/>
+              <a:t>The topic name</a:t>
+            </a:r>
+          </a:p>
+          <a:p>
+            <a:pPr lvl="1"/>
+            <a:r>
+              <a:rPr lang="en-US" dirty="0" smtClean="0"/>
+              <a:t>A serialization schema</a:t>
+            </a:r>
+          </a:p>
+          <a:p>
+            <a:pPr marL="457200" lvl="1" indent="0">
+              <a:buNone/>
+            </a:pPr>
+            <a:endParaRPr lang="en-US" sz="1600" dirty="0" smtClean="0">
+              <a:latin typeface="Menlo Regular"/>
+              <a:cs typeface="Menlo Regular"/>
+            </a:endParaRPr>
+          </a:p>
+          <a:p>
+            <a:pPr marL="457200" lvl="1" indent="0">
+              <a:buNone/>
+            </a:pPr>
+            <a:r>
+              <a:rPr lang="en-US" sz="2000" dirty="0" smtClean="0">
+                <a:latin typeface="Menlo Regular"/>
+                <a:cs typeface="Menlo Regular"/>
+              </a:rPr>
+              <a:t>DataStream</a:t>
+            </a:r>
+            <a:r>
+              <a:rPr lang="en-US" sz="2000" dirty="0">
+                <a:latin typeface="Menlo Regular"/>
+                <a:cs typeface="Menlo Regular"/>
+              </a:rPr>
+              <a:t>&lt;String&gt; </a:t>
+            </a:r>
+            <a:r>
+              <a:rPr lang="en-US" sz="2000" dirty="0" err="1" smtClean="0">
+                <a:latin typeface="Menlo Regular"/>
+                <a:cs typeface="Menlo Regular"/>
+              </a:rPr>
+              <a:t>aStream</a:t>
+            </a:r>
+            <a:r>
+              <a:rPr lang="en-US" sz="2000" dirty="0">
+                <a:latin typeface="Menlo Regular"/>
+                <a:cs typeface="Menlo Regular"/>
+              </a:rPr>
+              <a:t> </a:t>
+            </a:r>
+            <a:r>
+              <a:rPr lang="en-US" sz="2000" dirty="0" smtClean="0">
+                <a:latin typeface="Menlo Regular"/>
+                <a:cs typeface="Menlo Regular"/>
+              </a:rPr>
+              <a:t>= …</a:t>
+            </a:r>
+            <a:endParaRPr lang="en-US" sz="2000" dirty="0">
+              <a:latin typeface="Menlo Regular"/>
+              <a:cs typeface="Menlo Regular"/>
+            </a:endParaRPr>
+          </a:p>
+          <a:p>
+            <a:pPr marL="457200" lvl="1" indent="0">
+              <a:buNone/>
+            </a:pPr>
+            <a:r>
+              <a:rPr lang="en-US" sz="2000" dirty="0" err="1" smtClean="0">
+                <a:latin typeface="Menlo Regular"/>
+                <a:cs typeface="Menlo Regular"/>
+              </a:rPr>
+              <a:t>aStream.addSink</a:t>
+            </a:r>
+            <a:r>
+              <a:rPr lang="en-US" sz="2000" dirty="0" smtClean="0">
+                <a:latin typeface="Menlo Regular"/>
+                <a:cs typeface="Menlo Regular"/>
+              </a:rPr>
+              <a:t>(</a:t>
+            </a:r>
+          </a:p>
+          <a:p>
+            <a:pPr marL="457200" lvl="1" indent="0">
+              <a:buNone/>
+            </a:pPr>
+            <a:r>
+              <a:rPr lang="en-US" sz="2000" b="1" dirty="0">
+                <a:solidFill>
+                  <a:srgbClr val="000090"/>
+                </a:solidFill>
+                <a:latin typeface="Menlo Regular"/>
+                <a:cs typeface="Menlo Regular"/>
+              </a:rPr>
+              <a:t>	</a:t>
+            </a:r>
+            <a:r>
+              <a:rPr lang="en-US" sz="2000" b="1" dirty="0" smtClean="0">
+                <a:solidFill>
+                  <a:srgbClr val="000090"/>
+                </a:solidFill>
+                <a:latin typeface="Menlo Regular"/>
+                <a:cs typeface="Menlo Regular"/>
+              </a:rPr>
+              <a:t>new</a:t>
+            </a:r>
+            <a:r>
+              <a:rPr lang="en-US" sz="2400" b="1" dirty="0" smtClean="0">
+                <a:solidFill>
+                  <a:srgbClr val="000090"/>
+                </a:solidFill>
+                <a:latin typeface="Menlo Regular"/>
+                <a:cs typeface="Menlo Regular"/>
+              </a:rPr>
+              <a:t> </a:t>
+            </a:r>
+            <a:r>
+              <a:rPr lang="en-US" sz="2000" dirty="0" err="1" smtClean="0">
+                <a:latin typeface="Menlo Regular"/>
+                <a:cs typeface="Menlo Regular"/>
+              </a:rPr>
+              <a:t>KafkaSink</a:t>
+            </a:r>
+            <a:r>
+              <a:rPr lang="en-US" sz="2000" dirty="0" smtClean="0">
+                <a:latin typeface="Menlo Regular"/>
+                <a:cs typeface="Menlo Regular"/>
+              </a:rPr>
+              <a:t>&lt;</a:t>
+            </a:r>
+            <a:r>
+              <a:rPr lang="en-US" sz="2000" dirty="0">
+                <a:latin typeface="Menlo Regular"/>
+                <a:cs typeface="Menlo Regular"/>
+              </a:rPr>
+              <a:t>String&gt;(</a:t>
+            </a:r>
+          </a:p>
+          <a:p>
+            <a:pPr marL="457200" lvl="1" indent="0">
+              <a:buNone/>
+            </a:pPr>
+            <a:r>
+              <a:rPr lang="en-US" sz="2000" dirty="0">
+                <a:latin typeface="Menlo Regular"/>
+                <a:cs typeface="Menlo Regular"/>
+              </a:rPr>
+              <a:t>		</a:t>
+            </a:r>
+            <a:r>
+              <a:rPr lang="en-US" sz="1900" b="1" dirty="0">
+                <a:solidFill>
+                  <a:srgbClr val="008000"/>
+                </a:solidFill>
+                <a:latin typeface="Menlo"/>
+              </a:rPr>
+              <a:t>“localhost:9092”</a:t>
+            </a:r>
+            <a:r>
+              <a:rPr lang="en-US" sz="2000" dirty="0">
+                <a:latin typeface="Menlo Regular"/>
+                <a:cs typeface="Menlo Regular"/>
+              </a:rPr>
+              <a:t>, </a:t>
+            </a:r>
+            <a:r>
+              <a:rPr lang="en-US" sz="2000" dirty="0" smtClean="0">
+                <a:latin typeface="Menlo Regular"/>
+                <a:cs typeface="Menlo Regular"/>
+              </a:rPr>
+              <a:t>// default local broker</a:t>
+            </a:r>
+          </a:p>
+          <a:p>
+            <a:pPr marL="457200" lvl="1" indent="0">
+              <a:buNone/>
+            </a:pPr>
+            <a:r>
+              <a:rPr lang="en-US" sz="2000" dirty="0">
+                <a:latin typeface="Menlo Regular"/>
+                <a:cs typeface="Menlo Regular"/>
+              </a:rPr>
+              <a:t>	</a:t>
+            </a:r>
+            <a:r>
+              <a:rPr lang="en-US" sz="2000" dirty="0" smtClean="0">
+                <a:latin typeface="Menlo Regular"/>
+                <a:cs typeface="Menlo Regular"/>
+              </a:rPr>
+              <a:t>	</a:t>
+            </a:r>
+            <a:r>
+              <a:rPr lang="en-US" sz="1900" b="1" dirty="0">
+                <a:solidFill>
+                  <a:srgbClr val="008000"/>
+                </a:solidFill>
+                <a:latin typeface="Menlo"/>
+              </a:rPr>
+              <a:t>“</a:t>
+            </a:r>
+            <a:r>
+              <a:rPr lang="en-US" sz="1900" b="1" dirty="0" err="1">
+                <a:solidFill>
+                  <a:srgbClr val="008000"/>
+                </a:solidFill>
+                <a:latin typeface="Menlo"/>
+              </a:rPr>
+              <a:t>myTopic</a:t>
+            </a:r>
+            <a:r>
+              <a:rPr lang="en-US" sz="1900" b="1" dirty="0">
+                <a:solidFill>
+                  <a:srgbClr val="008000"/>
+                </a:solidFill>
+                <a:latin typeface="Menlo"/>
+              </a:rPr>
+              <a:t>”</a:t>
+            </a:r>
+            <a:r>
+              <a:rPr lang="en-US" sz="2000" dirty="0">
+                <a:latin typeface="Menlo Regular"/>
+                <a:cs typeface="Menlo Regular"/>
+              </a:rPr>
+              <a:t>, </a:t>
+            </a:r>
+            <a:endParaRPr lang="en-US" sz="2000" dirty="0" smtClean="0">
+              <a:latin typeface="Menlo Regular"/>
+              <a:cs typeface="Menlo Regular"/>
+            </a:endParaRPr>
+          </a:p>
+          <a:p>
+            <a:pPr marL="457200" lvl="1" indent="0">
+              <a:buNone/>
+            </a:pPr>
+            <a:r>
+              <a:rPr lang="en-US" sz="2000" dirty="0">
+                <a:latin typeface="Menlo Regular"/>
+                <a:cs typeface="Menlo Regular"/>
+              </a:rPr>
+              <a:t>	</a:t>
+            </a:r>
+            <a:r>
+              <a:rPr lang="en-US" sz="2000" dirty="0" smtClean="0">
+                <a:latin typeface="Menlo Regular"/>
+                <a:cs typeface="Menlo Regular"/>
+              </a:rPr>
+              <a:t>	</a:t>
+            </a:r>
+            <a:r>
+              <a:rPr lang="en-US" sz="2000" b="1" dirty="0">
+                <a:solidFill>
+                  <a:srgbClr val="000090"/>
+                </a:solidFill>
+                <a:latin typeface="Menlo Regular"/>
+                <a:cs typeface="Menlo Regular"/>
+              </a:rPr>
+              <a:t>new</a:t>
+            </a:r>
+            <a:r>
+              <a:rPr lang="en-US" sz="2000" dirty="0" smtClean="0">
+                <a:latin typeface="Menlo Regular"/>
+                <a:cs typeface="Menlo Regular"/>
+              </a:rPr>
+              <a:t> </a:t>
+            </a:r>
+            <a:r>
+              <a:rPr lang="en-US" sz="2000" dirty="0" err="1">
+                <a:latin typeface="Menlo Regular"/>
+                <a:cs typeface="Menlo Regular"/>
+              </a:rPr>
+              <a:t>SimpleStringSchema</a:t>
+            </a:r>
+            <a:r>
+              <a:rPr lang="en-US" sz="2000" dirty="0">
+                <a:latin typeface="Menlo Regular"/>
+                <a:cs typeface="Menlo Regular"/>
+              </a:rPr>
+              <a:t>));</a:t>
+            </a:r>
+          </a:p>
+          <a:p>
+            <a:pPr marL="457200" lvl="1" indent="0">
+              <a:buNone/>
+            </a:pPr>
+            <a:endParaRPr lang="en-US" dirty="0"/>
+          </a:p>
+        </p:txBody>
+      </p:sp>
+      <p:sp>
+        <p:nvSpPr>
+          <p:cNvPr id="4" name="Slide Number Placeholder 3"/>
+          <p:cNvSpPr>
+            <a:spLocks noGrp="1"/>
+          </p:cNvSpPr>
+          <p:nvPr>
+            <p:ph type="sldNum" sz="quarter" idx="12"/>
+          </p:nvPr>
+        </p:nvSpPr>
+        <p:spPr/>
+        <p:txBody>
+          <a:bodyPr/>
+          <a:lstStyle/>
+          <a:p>
+            <a:fld id="{B07C5D84-2227-C144-B485-A8CA33CE4230}" type="slidenum">
+              <a:rPr lang="en-US" smtClean="0">
+                <a:solidFill>
+                  <a:prstClr val="black">
+                    <a:tint val="75000"/>
+                  </a:prstClr>
+                </a:solidFill>
+              </a:rPr>
+              <a:pPr/>
+              <a:t>34</a:t>
+            </a:fld>
+            <a:endParaRPr lang="en-US">
+              <a:solidFill>
+                <a:prstClr val="black">
+                  <a:tint val="75000"/>
+                </a:prstClr>
+              </a:solidFill>
+            </a:endParaRPr>
+          </a:p>
+        </p:txBody>
+      </p:sp>
+    </p:spTree>
+    <p:extLst>
+      <p:ext uri="{BB962C8B-B14F-4D97-AF65-F5344CB8AC3E}">
+        <p14:creationId xmlns:p14="http://schemas.microsoft.com/office/powerpoint/2010/main" val="3827785449"/>
+      </p:ext>
+    </p:extLst>
+  </p:cSld>
+  <p:clrMapOvr>
+    <a:masterClrMapping/>
+  </p:clrMapOvr>
+  <p:timing>
+    <p:tnLst>
+      <p:par>
+        <p:cTn xmlns:p14="http://schemas.microsoft.com/office/powerpoint/2010/main" id="1" dur="indefinite" restart="never" nodeType="tmRoot"/>
+      </p:par>
+    </p:tnLst>
+  </p:timing>
+</p:sld>
+</file>
+
+<file path=ppt/slides/slide35.xml><?xml version="1.0" encoding="utf-8"?>
+<p:sld xmlns:a="http://schemas.openxmlformats.org/drawingml/2006/main" xmlns:r="http://schemas.openxmlformats.org/officeDocument/2006/relationships" xmlns:p="http://schemas.openxmlformats.org/presentationml/2006/main">
+  <p:cSld>
+    <p:spTree>
+      <p:nvGrpSpPr>
+        <p:cNvPr id="1" name=""/>
+        <p:cNvGrpSpPr/>
+        <p:nvPr/>
+      </p:nvGrpSpPr>
+      <p:grpSpPr>
+        <a:xfrm>
+          <a:off x="0" y="0"/>
+          <a:ext cx="0" cy="0"/>
+          <a:chOff x="0" y="0"/>
+          <a:chExt cx="0" cy="0"/>
+        </a:xfrm>
+      </p:grpSpPr>
+      <p:sp>
+        <p:nvSpPr>
+          <p:cNvPr id="2" name="Title 1"/>
+          <p:cNvSpPr>
+            <a:spLocks noGrp="1"/>
+          </p:cNvSpPr>
+          <p:nvPr>
+            <p:ph type="title"/>
+          </p:nvPr>
+        </p:nvSpPr>
+        <p:spPr/>
+        <p:txBody>
+          <a:bodyPr/>
+          <a:lstStyle/>
+          <a:p>
+            <a:r>
+              <a:rPr lang="en-US" dirty="0" smtClean="0"/>
+              <a:t>More API features</a:t>
+            </a:r>
             <a:endParaRPr lang="en-US" dirty="0"/>
           </a:p>
         </p:txBody>
@@ -13964,7 +15210,237 @@
             <a:fld id="{B07C5D84-2227-C144-B485-A8CA33CE4230}" type="slidenum">
               <a:rPr lang="en-US" smtClean="0"/>
               <a:pPr/>
-              <a:t>33</a:t>
+              <a:t>35</a:t>
+            </a:fld>
+            <a:endParaRPr lang="en-US"/>
+          </a:p>
+        </p:txBody>
+      </p:sp>
+    </p:spTree>
+    <p:extLst>
+      <p:ext uri="{BB962C8B-B14F-4D97-AF65-F5344CB8AC3E}">
+        <p14:creationId xmlns:p14="http://schemas.microsoft.com/office/powerpoint/2010/main" val="1460006872"/>
+      </p:ext>
+    </p:extLst>
+  </p:cSld>
+  <p:clrMapOvr>
+    <a:masterClrMapping/>
+  </p:clrMapOvr>
+  <p:timing>
+    <p:tnLst>
+      <p:par>
+        <p:cTn xmlns:p14="http://schemas.microsoft.com/office/powerpoint/2010/main" id="1" dur="indefinite" restart="never" nodeType="tmRoot"/>
+      </p:par>
+    </p:tnLst>
+  </p:timing>
+</p:sld>
+</file>
+
+<file path=ppt/slides/slide36.xml><?xml version="1.0" encoding="utf-8"?>
+<p:sld xmlns:a="http://schemas.openxmlformats.org/drawingml/2006/main" xmlns:r="http://schemas.openxmlformats.org/officeDocument/2006/relationships" xmlns:p="http://schemas.openxmlformats.org/presentationml/2006/main">
+  <p:cSld>
+    <p:spTree>
+      <p:nvGrpSpPr>
+        <p:cNvPr id="1" name=""/>
+        <p:cNvGrpSpPr/>
+        <p:nvPr/>
+      </p:nvGrpSpPr>
+      <p:grpSpPr>
+        <a:xfrm>
+          <a:off x="0" y="0"/>
+          <a:ext cx="0" cy="0"/>
+          <a:chOff x="0" y="0"/>
+          <a:chExt cx="0" cy="0"/>
+        </a:xfrm>
+      </p:grpSpPr>
+      <p:sp>
+        <p:nvSpPr>
+          <p:cNvPr id="5" name="Title 4"/>
+          <p:cNvSpPr>
+            <a:spLocks noGrp="1"/>
+          </p:cNvSpPr>
+          <p:nvPr>
+            <p:ph type="title"/>
+          </p:nvPr>
+        </p:nvSpPr>
+        <p:spPr/>
+        <p:txBody>
+          <a:bodyPr/>
+          <a:lstStyle/>
+          <a:p>
+            <a:r>
+              <a:rPr lang="en-US" dirty="0" smtClean="0"/>
+              <a:t>Not covered here</a:t>
+            </a:r>
+            <a:endParaRPr lang="en-US" dirty="0"/>
+          </a:p>
+        </p:txBody>
+      </p:sp>
+      <p:sp>
+        <p:nvSpPr>
+          <p:cNvPr id="6" name="Content Placeholder 5"/>
+          <p:cNvSpPr>
+            <a:spLocks noGrp="1"/>
+          </p:cNvSpPr>
+          <p:nvPr>
+            <p:ph idx="1"/>
+          </p:nvPr>
+        </p:nvSpPr>
+        <p:spPr/>
+        <p:txBody>
+          <a:bodyPr/>
+          <a:lstStyle/>
+          <a:p>
+            <a:r>
+              <a:rPr lang="en-US" dirty="0" smtClean="0"/>
+              <a:t>Iterations (feedback edges)</a:t>
+            </a:r>
+          </a:p>
+          <a:p>
+            <a:pPr lvl="1"/>
+            <a:r>
+              <a:rPr lang="en-US" dirty="0" smtClean="0"/>
+              <a:t>Very useful for Machine Learning</a:t>
+            </a:r>
+          </a:p>
+          <a:p>
+            <a:pPr lvl="7"/>
+            <a:endParaRPr lang="en-US" dirty="0" smtClean="0"/>
+          </a:p>
+          <a:p>
+            <a:r>
+              <a:rPr lang="en-US" dirty="0" smtClean="0"/>
+              <a:t>More transformations</a:t>
+            </a:r>
+          </a:p>
+          <a:p>
+            <a:pPr lvl="1"/>
+            <a:r>
+              <a:rPr lang="en-US" dirty="0" smtClean="0"/>
+              <a:t>union, join, ...</a:t>
+            </a:r>
+            <a:endParaRPr lang="en-US" dirty="0"/>
+          </a:p>
+        </p:txBody>
+      </p:sp>
+      <p:sp>
+        <p:nvSpPr>
+          <p:cNvPr id="4" name="Slide Number Placeholder 3"/>
+          <p:cNvSpPr>
+            <a:spLocks noGrp="1"/>
+          </p:cNvSpPr>
+          <p:nvPr>
+            <p:ph type="sldNum" sz="quarter" idx="12"/>
+          </p:nvPr>
+        </p:nvSpPr>
+        <p:spPr/>
+        <p:txBody>
+          <a:bodyPr/>
+          <a:lstStyle/>
+          <a:p>
+            <a:fld id="{B07C5D84-2227-C144-B485-A8CA33CE4230}" type="slidenum">
+              <a:rPr lang="en-US" smtClean="0"/>
+              <a:pPr/>
+              <a:t>36</a:t>
+            </a:fld>
+            <a:endParaRPr lang="en-US"/>
+          </a:p>
+        </p:txBody>
+      </p:sp>
+    </p:spTree>
+    <p:extLst>
+      <p:ext uri="{BB962C8B-B14F-4D97-AF65-F5344CB8AC3E}">
+        <p14:creationId xmlns:p14="http://schemas.microsoft.com/office/powerpoint/2010/main" val="1529586904"/>
+      </p:ext>
+    </p:extLst>
+  </p:cSld>
+  <p:clrMapOvr>
+    <a:masterClrMapping/>
+  </p:clrMapOvr>
+  <p:timing>
+    <p:tnLst>
+      <p:par>
+        <p:cTn xmlns:p14="http://schemas.microsoft.com/office/powerpoint/2010/main" id="1" dur="indefinite" restart="never" nodeType="tmRoot"/>
+      </p:par>
+    </p:tnLst>
+  </p:timing>
+</p:sld>
+</file>
+
+<file path=ppt/slides/slide37.xml><?xml version="1.0" encoding="utf-8"?>
+<p:sld xmlns:a="http://schemas.openxmlformats.org/drawingml/2006/main" xmlns:r="http://schemas.openxmlformats.org/officeDocument/2006/relationships" xmlns:p="http://schemas.openxmlformats.org/presentationml/2006/main">
+  <p:cSld>
+    <p:spTree>
+      <p:nvGrpSpPr>
+        <p:cNvPr id="1" name=""/>
+        <p:cNvGrpSpPr/>
+        <p:nvPr/>
+      </p:nvGrpSpPr>
+      <p:grpSpPr>
+        <a:xfrm>
+          <a:off x="0" y="0"/>
+          <a:ext cx="0" cy="0"/>
+          <a:chOff x="0" y="0"/>
+          <a:chExt cx="0" cy="0"/>
+        </a:xfrm>
+      </p:grpSpPr>
+      <p:sp>
+        <p:nvSpPr>
+          <p:cNvPr id="2" name="Title 1"/>
+          <p:cNvSpPr>
+            <a:spLocks noGrp="1"/>
+          </p:cNvSpPr>
+          <p:nvPr>
+            <p:ph type="title"/>
+          </p:nvPr>
+        </p:nvSpPr>
+        <p:spPr/>
+        <p:txBody>
+          <a:bodyPr/>
+          <a:lstStyle/>
+          <a:p>
+            <a:endParaRPr lang="en-US" dirty="0"/>
+          </a:p>
+        </p:txBody>
+      </p:sp>
+      <p:sp>
+        <p:nvSpPr>
+          <p:cNvPr id="3" name="Text Placeholder 2"/>
+          <p:cNvSpPr>
+            <a:spLocks noGrp="1"/>
+          </p:cNvSpPr>
+          <p:nvPr>
+            <p:ph type="body" idx="1"/>
+          </p:nvPr>
+        </p:nvSpPr>
+        <p:spPr/>
+        <p:txBody>
+          <a:bodyPr/>
+          <a:lstStyle/>
+          <a:p>
+            <a:endParaRPr lang="en-US"/>
+          </a:p>
+        </p:txBody>
+      </p:sp>
+      <p:sp>
+        <p:nvSpPr>
+          <p:cNvPr id="4" name="Slide Number Placeholder 3"/>
+          <p:cNvSpPr>
+            <a:spLocks noGrp="1"/>
+          </p:cNvSpPr>
+          <p:nvPr>
+            <p:ph type="sldNum" sz="quarter" idx="12"/>
+          </p:nvPr>
+        </p:nvSpPr>
+        <p:spPr/>
+        <p:txBody>
+          <a:bodyPr/>
+          <a:lstStyle/>
+          <a:p>
+            <a:fld id="{B07C5D84-2227-C144-B485-A8CA33CE4230}" type="slidenum">
+              <a:rPr lang="en-US" smtClean="0"/>
+              <a:pPr/>
+              <a:t>37</a:t>
             </a:fld>
             <a:endParaRPr lang="en-US"/>
           </a:p>

</xml_diff>

<commit_message>
Fix alignment and Capitalisation in Stream Training Slides
</commit_message>
<xml_diff>
--- a/slides/flink_stream_advanced.pptx
+++ b/slides/flink_stream_advanced.pptx
@@ -244,7 +244,7 @@
           <a:p>
             <a:fld id="{F01141F9-3E73-7448-86C2-E96D93FE379F}" type="datetimeFigureOut">
               <a:rPr lang="en-US" smtClean="0"/>
-              <a:t>08/10/15</a:t>
+              <a:t>13.10.15</a:t>
             </a:fld>
             <a:endParaRPr lang="en-US"/>
           </a:p>
@@ -4668,11 +4668,11 @@
           <a:p>
             <a:r>
               <a:rPr lang="en-US" dirty="0" smtClean="0"/>
-              <a:t>Composite &amp; nested </a:t>
+              <a:t>Composite &amp; Nested </a:t>
             </a:r>
             <a:r>
               <a:rPr lang="en-US" dirty="0"/>
-              <a:t>k</a:t>
+              <a:t>K</a:t>
             </a:r>
             <a:r>
               <a:rPr lang="en-US" dirty="0" smtClean="0"/>
@@ -5439,7 +5439,7 @@
           <a:p>
             <a:r>
               <a:rPr lang="en-US" dirty="0" smtClean="0"/>
-              <a:t>Windows and aggregates</a:t>
+              <a:t>Windows and Aggregates</a:t>
             </a:r>
             <a:endParaRPr lang="en-US" dirty="0"/>
           </a:p>
@@ -6276,7 +6276,7 @@
           <a:p>
             <a:r>
               <a:rPr lang="en-US" dirty="0" smtClean="0"/>
-              <a:t>Types of windows</a:t>
+              <a:t>Types of Windows</a:t>
             </a:r>
             <a:endParaRPr lang="en-US" dirty="0"/>
           </a:p>
@@ -6635,7 +6635,15 @@
           <a:p>
             <a:r>
               <a:rPr lang="en-US" sz="3200" dirty="0" smtClean="0"/>
-              <a:t>Aggregations on windowed streams</a:t>
+              <a:t>Aggregations on Windowed </a:t>
+            </a:r>
+            <a:r>
+              <a:rPr lang="en-US" sz="3200" dirty="0"/>
+              <a:t>S</a:t>
+            </a:r>
+            <a:r>
+              <a:rPr lang="en-US" sz="3200" dirty="0" smtClean="0"/>
+              <a:t>treams</a:t>
             </a:r>
             <a:endParaRPr lang="en-US" sz="3200" dirty="0"/>
           </a:p>
@@ -7155,6 +7163,84 @@
               </a:rPr>
               <a:t>());</a:t>
             </a:r>
+          </a:p>
+        </p:txBody>
+      </p:sp>
+      <p:sp>
+        <p:nvSpPr>
+          <p:cNvPr id="6" name="TextBox 5"/>
+          <p:cNvSpPr txBox="1"/>
+          <p:nvPr/>
+        </p:nvSpPr>
+        <p:spPr>
+          <a:xfrm>
+            <a:off x="5140889" y="5432203"/>
+            <a:ext cx="3545911" cy="707886"/>
+          </a:xfrm>
+          <a:prstGeom prst="rect">
+            <a:avLst/>
+          </a:prstGeom>
+          <a:blipFill rotWithShape="1">
+            <a:blip r:embed="rId2"/>
+            <a:tile tx="0" ty="0" sx="100000" sy="100000" flip="none" algn="tl"/>
+          </a:blipFill>
+          <a:ln>
+            <a:solidFill>
+              <a:schemeClr val="tx1"/>
+            </a:solidFill>
+          </a:ln>
+        </p:spPr>
+        <p:txBody>
+          <a:bodyPr wrap="square" rtlCol="0">
+            <a:spAutoFit/>
+          </a:bodyPr>
+          <a:lstStyle/>
+          <a:p>
+            <a:r>
+              <a:rPr lang="en-US" sz="2000" b="1" dirty="0" smtClean="0">
+                <a:latin typeface="American Typewriter"/>
+                <a:cs typeface="American Typewriter"/>
+              </a:rPr>
+              <a:t>Warning</a:t>
+            </a:r>
+            <a:r>
+              <a:rPr lang="en-US" sz="2000" b="1" dirty="0">
+                <a:latin typeface="American Typewriter"/>
+                <a:cs typeface="American Typewriter"/>
+              </a:rPr>
+              <a:t>: </a:t>
+            </a:r>
+            <a:r>
+              <a:rPr lang="en-US" sz="2000" b="1" dirty="0" smtClean="0">
+                <a:latin typeface="American Typewriter"/>
+                <a:cs typeface="American Typewriter"/>
+              </a:rPr>
+              <a:t>0.9 -&gt; 0.10 </a:t>
+            </a:r>
+            <a:endParaRPr lang="en-US" sz="2000" dirty="0">
+              <a:latin typeface="American Typewriter"/>
+              <a:cs typeface="American Typewriter"/>
+            </a:endParaRPr>
+          </a:p>
+          <a:p>
+            <a:r>
+              <a:rPr lang="en-US" sz="2000" dirty="0" err="1" smtClean="0">
+                <a:latin typeface="American Typewriter"/>
+                <a:cs typeface="American Typewriter"/>
+              </a:rPr>
+              <a:t>mapWindow</a:t>
+            </a:r>
+            <a:r>
+              <a:rPr lang="en-US" sz="2000" dirty="0" smtClean="0">
+                <a:latin typeface="American Typewriter"/>
+                <a:cs typeface="American Typewriter"/>
+              </a:rPr>
+              <a:t> becomes apply</a:t>
+            </a:r>
+            <a:endParaRPr lang="en-US" sz="2000" dirty="0">
+              <a:latin typeface="American Typewriter"/>
+              <a:cs typeface="American Typewriter"/>
+            </a:endParaRPr>
           </a:p>
         </p:txBody>
       </p:sp>
@@ -7772,7 +7858,7 @@
                 </a:solidFill>
                 <a:latin typeface="Menlo"/>
               </a:rPr>
-              <a:t>Tuple2&lt;Integer, Integer</a:t>
+              <a:t>Tuple2</a:t>
             </a:r>
             <a:r>
               <a:rPr lang="en-US" sz="1500" dirty="0" smtClean="0">
@@ -7781,30 +7867,7 @@
                 </a:solidFill>
                 <a:latin typeface="Menlo"/>
               </a:rPr>
-              <a:t>&gt;</a:t>
-            </a:r>
-          </a:p>
-          <a:p>
-            <a:pPr marL="0" indent="0">
-              <a:buNone/>
-            </a:pPr>
-            <a:r>
-              <a:rPr lang="en-US" sz="1500" dirty="0">
-                <a:solidFill>
-                  <a:srgbClr val="000000"/>
-                </a:solidFill>
-                <a:latin typeface="Menlo"/>
-              </a:rPr>
-              <a:t>	</a:t>
-            </a:r>
-            <a:r>
-              <a:rPr lang="en-US" sz="1500" dirty="0" smtClean="0">
-                <a:solidFill>
-                  <a:srgbClr val="000000"/>
-                </a:solidFill>
-                <a:latin typeface="Menlo"/>
-              </a:rPr>
-              <a:t>										(</a:t>
+              <a:t>&lt;&gt;(</a:t>
             </a:r>
             <a:r>
               <a:rPr lang="en-US" sz="1500" dirty="0" err="1">
@@ -7945,6 +8008,91 @@
                   <a:tint val="75000"/>
                 </a:prstClr>
               </a:solidFill>
+            </a:endParaRPr>
+          </a:p>
+        </p:txBody>
+      </p:sp>
+      <p:sp>
+        <p:nvSpPr>
+          <p:cNvPr id="5" name="TextBox 4"/>
+          <p:cNvSpPr txBox="1"/>
+          <p:nvPr/>
+        </p:nvSpPr>
+        <p:spPr>
+          <a:xfrm>
+            <a:off x="1900726" y="5982770"/>
+            <a:ext cx="6293615" cy="707886"/>
+          </a:xfrm>
+          <a:prstGeom prst="rect">
+            <a:avLst/>
+          </a:prstGeom>
+          <a:blipFill rotWithShape="1">
+            <a:blip r:embed="rId2"/>
+            <a:tile tx="0" ty="0" sx="100000" sy="100000" flip="none" algn="tl"/>
+          </a:blipFill>
+          <a:ln>
+            <a:solidFill>
+              <a:schemeClr val="tx1"/>
+            </a:solidFill>
+          </a:ln>
+        </p:spPr>
+        <p:txBody>
+          <a:bodyPr wrap="square" rtlCol="0">
+            <a:spAutoFit/>
+          </a:bodyPr>
+          <a:lstStyle/>
+          <a:p>
+            <a:r>
+              <a:rPr lang="en-US" sz="2000" b="1" dirty="0" smtClean="0">
+                <a:latin typeface="American Typewriter"/>
+                <a:cs typeface="American Typewriter"/>
+              </a:rPr>
+              <a:t>Warning</a:t>
+            </a:r>
+            <a:r>
+              <a:rPr lang="en-US" sz="2000" b="1" dirty="0">
+                <a:latin typeface="American Typewriter"/>
+                <a:cs typeface="American Typewriter"/>
+              </a:rPr>
+              <a:t>: </a:t>
+            </a:r>
+            <a:r>
+              <a:rPr lang="en-US" sz="2000" b="1" dirty="0" smtClean="0">
+                <a:latin typeface="American Typewriter"/>
+                <a:cs typeface="American Typewriter"/>
+              </a:rPr>
+              <a:t>0.9 -&gt; 0.10 </a:t>
+            </a:r>
+            <a:endParaRPr lang="en-US" sz="2000" dirty="0">
+              <a:latin typeface="American Typewriter"/>
+              <a:cs typeface="American Typewriter"/>
+            </a:endParaRPr>
+          </a:p>
+          <a:p>
+            <a:r>
+              <a:rPr lang="en-US" sz="2000" dirty="0" err="1" smtClean="0">
+                <a:latin typeface="American Typewriter"/>
+                <a:cs typeface="American Typewriter"/>
+              </a:rPr>
+              <a:t>WindowMapFunction</a:t>
+            </a:r>
+            <a:r>
+              <a:rPr lang="en-US" sz="2000" dirty="0" smtClean="0">
+                <a:latin typeface="American Typewriter"/>
+                <a:cs typeface="American Typewriter"/>
+              </a:rPr>
+              <a:t> becomes </a:t>
+            </a:r>
+            <a:r>
+              <a:rPr lang="en-US" sz="2000" dirty="0" err="1" smtClean="0">
+                <a:latin typeface="American Typewriter"/>
+                <a:cs typeface="American Typewriter"/>
+              </a:rPr>
+              <a:t>WindowFunction</a:t>
+            </a:r>
+            <a:endParaRPr lang="en-US" sz="2000" dirty="0">
+              <a:latin typeface="American Typewriter"/>
+              <a:cs typeface="American Typewriter"/>
             </a:endParaRPr>
           </a:p>
         </p:txBody>
@@ -8177,11 +8325,7 @@
           <a:p>
             <a:r>
               <a:rPr lang="en-US" sz="3600" dirty="0" smtClean="0"/>
-              <a:t>Operations on </a:t>
-            </a:r>
-            <a:r>
-              <a:rPr lang="en-US" sz="3600" dirty="0" err="1" smtClean="0"/>
-              <a:t>WindowedStreams</a:t>
+              <a:t>Operations on Windowed Streams</a:t>
             </a:r>
             <a:endParaRPr lang="en-US" sz="3600" dirty="0"/>
           </a:p>
@@ -8296,6 +8440,100 @@
           </a:p>
         </p:txBody>
       </p:sp>
+      <p:sp>
+        <p:nvSpPr>
+          <p:cNvPr id="5" name="TextBox 4"/>
+          <p:cNvSpPr txBox="1"/>
+          <p:nvPr/>
+        </p:nvSpPr>
+        <p:spPr>
+          <a:xfrm>
+            <a:off x="4112478" y="5110501"/>
+            <a:ext cx="4263294" cy="1015663"/>
+          </a:xfrm>
+          <a:prstGeom prst="rect">
+            <a:avLst/>
+          </a:prstGeom>
+          <a:blipFill rotWithShape="1">
+            <a:blip r:embed="rId2"/>
+            <a:tile tx="0" ty="0" sx="100000" sy="100000" flip="none" algn="tl"/>
+          </a:blipFill>
+          <a:ln>
+            <a:solidFill>
+              <a:schemeClr val="tx1"/>
+            </a:solidFill>
+          </a:ln>
+        </p:spPr>
+        <p:txBody>
+          <a:bodyPr wrap="square" rtlCol="0">
+            <a:spAutoFit/>
+          </a:bodyPr>
+          <a:lstStyle/>
+          <a:p>
+            <a:r>
+              <a:rPr lang="en-US" sz="2000" b="1" dirty="0" smtClean="0">
+                <a:latin typeface="American Typewriter"/>
+                <a:cs typeface="American Typewriter"/>
+              </a:rPr>
+              <a:t>Warning</a:t>
+            </a:r>
+            <a:r>
+              <a:rPr lang="en-US" sz="2000" b="1" dirty="0">
+                <a:latin typeface="American Typewriter"/>
+                <a:cs typeface="American Typewriter"/>
+              </a:rPr>
+              <a:t>: </a:t>
+            </a:r>
+            <a:r>
+              <a:rPr lang="en-US" sz="2000" b="1" dirty="0" smtClean="0">
+                <a:latin typeface="American Typewriter"/>
+                <a:cs typeface="American Typewriter"/>
+              </a:rPr>
+              <a:t>0.9 -&gt; 0.10 </a:t>
+            </a:r>
+            <a:endParaRPr lang="en-US" sz="2000" dirty="0">
+              <a:latin typeface="American Typewriter"/>
+              <a:cs typeface="American Typewriter"/>
+            </a:endParaRPr>
+          </a:p>
+          <a:p>
+            <a:r>
+              <a:rPr lang="en-US" sz="2000" dirty="0" err="1" smtClean="0">
+                <a:latin typeface="American Typewriter"/>
+                <a:cs typeface="American Typewriter"/>
+              </a:rPr>
+              <a:t>mapWindow</a:t>
+            </a:r>
+            <a:r>
+              <a:rPr lang="en-US" sz="2000" dirty="0" smtClean="0">
+                <a:latin typeface="American Typewriter"/>
+                <a:cs typeface="American Typewriter"/>
+              </a:rPr>
+              <a:t> becomes apply</a:t>
+            </a:r>
+          </a:p>
+          <a:p>
+            <a:r>
+              <a:rPr lang="en-US" sz="2000" dirty="0" err="1" smtClean="0">
+                <a:latin typeface="American Typewriter"/>
+                <a:cs typeface="American Typewriter"/>
+              </a:rPr>
+              <a:t>reduceWindow</a:t>
+            </a:r>
+            <a:r>
+              <a:rPr lang="en-US" sz="2000" dirty="0" smtClean="0">
+                <a:latin typeface="American Typewriter"/>
+                <a:cs typeface="American Typewriter"/>
+              </a:rPr>
+              <a:t> becomes reduce</a:t>
+            </a:r>
+            <a:endParaRPr lang="en-US" sz="2000" dirty="0">
+              <a:latin typeface="American Typewriter"/>
+              <a:cs typeface="American Typewriter"/>
+            </a:endParaRPr>
+          </a:p>
+        </p:txBody>
+      </p:sp>
     </p:spTree>
     <p:extLst>
       <p:ext uri="{BB962C8B-B14F-4D97-AF65-F5344CB8AC3E}">
@@ -8309,9 +8547,88 @@
   <p:timing>
     <p:tnLst>
       <p:par>
-        <p:cTn xmlns:p14="http://schemas.microsoft.com/office/powerpoint/2010/main" id="1" dur="indefinite" restart="never" nodeType="tmRoot"/>
+        <p:cTn xmlns:p14="http://schemas.microsoft.com/office/powerpoint/2010/main" id="1" dur="indefinite" restart="never" nodeType="tmRoot">
+          <p:childTnLst>
+            <p:seq concurrent="1" nextAc="seek">
+              <p:cTn id="2" dur="indefinite" nodeType="mainSeq">
+                <p:childTnLst>
+                  <p:par>
+                    <p:cTn id="3" fill="hold">
+                      <p:stCondLst>
+                        <p:cond delay="indefinite"/>
+                      </p:stCondLst>
+                      <p:childTnLst>
+                        <p:par>
+                          <p:cTn id="4" fill="hold">
+                            <p:stCondLst>
+                              <p:cond delay="0"/>
+                            </p:stCondLst>
+                            <p:childTnLst>
+                              <p:par>
+                                <p:cTn id="5" presetID="10" presetClass="entr" presetSubtype="0" fill="hold" grpId="0" nodeType="clickEffect">
+                                  <p:stCondLst>
+                                    <p:cond delay="0"/>
+                                  </p:stCondLst>
+                                  <p:childTnLst>
+                                    <p:set>
+                                      <p:cBhvr>
+                                        <p:cTn id="6" dur="1" fill="hold">
+                                          <p:stCondLst>
+                                            <p:cond delay="0"/>
+                                          </p:stCondLst>
+                                        </p:cTn>
+                                        <p:tgtEl>
+                                          <p:spTgt spid="5"/>
+                                        </p:tgtEl>
+                                        <p:attrNameLst>
+                                          <p:attrName>style.visibility</p:attrName>
+                                        </p:attrNameLst>
+                                      </p:cBhvr>
+                                      <p:to>
+                                        <p:strVal val="visible"/>
+                                      </p:to>
+                                    </p:set>
+                                    <p:animEffect transition="in" filter="fade">
+                                      <p:cBhvr>
+                                        <p:cTn id="7" dur="500"/>
+                                        <p:tgtEl>
+                                          <p:spTgt spid="5"/>
+                                        </p:tgtEl>
+                                      </p:cBhvr>
+                                    </p:animEffect>
+                                  </p:childTnLst>
+                                </p:cTn>
+                              </p:par>
+                            </p:childTnLst>
+                          </p:cTn>
+                        </p:par>
+                      </p:childTnLst>
+                    </p:cTn>
+                  </p:par>
+                </p:childTnLst>
+              </p:cTn>
+              <p:prevCondLst>
+                <p:cond evt="onPrev" delay="0">
+                  <p:tgtEl>
+                    <p:sldTgt/>
+                  </p:tgtEl>
+                </p:cond>
+              </p:prevCondLst>
+              <p:nextCondLst>
+                <p:cond evt="onNext" delay="0">
+                  <p:tgtEl>
+                    <p:sldTgt/>
+                  </p:tgtEl>
+                </p:cond>
+              </p:nextCondLst>
+            </p:seq>
+          </p:childTnLst>
+        </p:cTn>
       </p:par>
     </p:tnLst>
+    <p:bldLst>
+      <p:bldP spid="5" grpId="0" animBg="1"/>
+    </p:bldLst>
   </p:timing>
 </p:sld>
 </file>
@@ -8350,7 +8667,23 @@
           <a:p>
             <a:r>
               <a:rPr lang="en-US" dirty="0" smtClean="0"/>
-              <a:t>Working with multiple streams</a:t>
+              <a:t>Working With </a:t>
+            </a:r>
+            <a:r>
+              <a:rPr lang="en-US" dirty="0"/>
+              <a:t>M</a:t>
+            </a:r>
+            <a:r>
+              <a:rPr lang="en-US" dirty="0" smtClean="0"/>
+              <a:t>ultiple </a:t>
+            </a:r>
+            <a:r>
+              <a:rPr lang="en-US" dirty="0"/>
+              <a:t>S</a:t>
+            </a:r>
+            <a:r>
+              <a:rPr lang="en-US" dirty="0" smtClean="0"/>
+              <a:t>treams</a:t>
             </a:r>
             <a:endParaRPr lang="en-US" dirty="0"/>
           </a:p>
@@ -8473,7 +8806,7 @@
           <a:p>
             <a:r>
               <a:rPr lang="en-US" dirty="0" smtClean="0"/>
-              <a:t>Connecting streams</a:t>
+              <a:t>Connecting Streams</a:t>
             </a:r>
             <a:endParaRPr lang="en-US" dirty="0"/>
           </a:p>
@@ -8924,7 +9257,15 @@
           <a:p>
             <a:r>
               <a:rPr lang="en-US" sz="4000" dirty="0" smtClean="0"/>
-              <a:t>Map on connected streams</a:t>
+              <a:t>Map on Connected </a:t>
+            </a:r>
+            <a:r>
+              <a:rPr lang="en-US" sz="4000" dirty="0"/>
+              <a:t>S</a:t>
+            </a:r>
+            <a:r>
+              <a:rPr lang="en-US" sz="4000" dirty="0" smtClean="0"/>
+              <a:t>treams</a:t>
             </a:r>
             <a:endParaRPr lang="en-US" sz="4000" dirty="0"/>
           </a:p>
@@ -9594,7 +9935,7 @@
         <p:spPr/>
         <p:txBody>
           <a:bodyPr>
-            <a:normAutofit/>
+            <a:normAutofit fontScale="90000"/>
           </a:bodyPr>
           <a:lstStyle/>
           <a:p>
@@ -9604,7 +9945,15 @@
             </a:r>
             <a:r>
               <a:rPr lang="en-US" sz="4000" dirty="0" smtClean="0"/>
-              <a:t> on connected streams</a:t>
+              <a:t> on Connected </a:t>
+            </a:r>
+            <a:r>
+              <a:rPr lang="en-US" sz="4000" dirty="0"/>
+              <a:t>S</a:t>
+            </a:r>
+            <a:r>
+              <a:rPr lang="en-US" sz="4000" dirty="0" smtClean="0"/>
+              <a:t>treams</a:t>
             </a:r>
             <a:endParaRPr lang="en-US" sz="4000" dirty="0"/>
           </a:p>
@@ -10617,71 +10966,6 @@
           </a:p>
         </p:txBody>
       </p:sp>
-      <p:sp>
-        <p:nvSpPr>
-          <p:cNvPr id="6" name="TextBox 5"/>
-          <p:cNvSpPr txBox="1"/>
-          <p:nvPr/>
-        </p:nvSpPr>
-        <p:spPr>
-          <a:xfrm>
-            <a:off x="4951310" y="5780762"/>
-            <a:ext cx="2742168" cy="830997"/>
-          </a:xfrm>
-          <a:prstGeom prst="rect">
-            <a:avLst/>
-          </a:prstGeom>
-          <a:blipFill rotWithShape="1">
-            <a:blip r:embed="rId2"/>
-            <a:tile tx="0" ty="0" sx="100000" sy="100000" flip="none" algn="tl"/>
-          </a:blipFill>
-          <a:ln>
-            <a:solidFill>
-              <a:schemeClr val="tx1"/>
-            </a:solidFill>
-          </a:ln>
-        </p:spPr>
-        <p:txBody>
-          <a:bodyPr wrap="square" rtlCol="0">
-            <a:spAutoFit/>
-          </a:bodyPr>
-          <a:lstStyle/>
-          <a:p>
-            <a:r>
-              <a:rPr lang="en-US" sz="2400" b="1" dirty="0" smtClean="0">
-                <a:latin typeface="American Typewriter"/>
-                <a:cs typeface="American Typewriter"/>
-              </a:rPr>
-              <a:t>Note: </a:t>
-            </a:r>
-            <a:r>
-              <a:rPr lang="en-US" sz="2400" dirty="0" smtClean="0">
-                <a:latin typeface="American Typewriter"/>
-                <a:cs typeface="American Typewriter"/>
-              </a:rPr>
-              <a:t>Identical to </a:t>
-            </a:r>
-            <a:r>
-              <a:rPr lang="en-US" sz="2400" dirty="0" err="1" smtClean="0">
-                <a:latin typeface="American Typewriter"/>
-                <a:cs typeface="American Typewriter"/>
-              </a:rPr>
-              <a:t>DataSet</a:t>
-            </a:r>
-            <a:r>
-              <a:rPr lang="en-US" sz="2400" dirty="0" smtClean="0">
-                <a:latin typeface="American Typewriter"/>
-                <a:cs typeface="American Typewriter"/>
-              </a:rPr>
-              <a:t> API</a:t>
-            </a:r>
-            <a:endParaRPr lang="en-US" sz="2400" dirty="0">
-              <a:latin typeface="American Typewriter"/>
-              <a:cs typeface="American Typewriter"/>
-            </a:endParaRPr>
-          </a:p>
-        </p:txBody>
-      </p:sp>
     </p:spTree>
     <p:extLst>
       <p:ext uri="{BB962C8B-B14F-4D97-AF65-F5344CB8AC3E}">
@@ -10892,71 +11176,6 @@
           </a:p>
         </p:txBody>
       </p:sp>
-      <p:sp>
-        <p:nvSpPr>
-          <p:cNvPr id="7" name="TextBox 6"/>
-          <p:cNvSpPr txBox="1"/>
-          <p:nvPr/>
-        </p:nvSpPr>
-        <p:spPr>
-          <a:xfrm>
-            <a:off x="4951310" y="5780762"/>
-            <a:ext cx="2742168" cy="830997"/>
-          </a:xfrm>
-          <a:prstGeom prst="rect">
-            <a:avLst/>
-          </a:prstGeom>
-          <a:blipFill rotWithShape="1">
-            <a:blip r:embed="rId2"/>
-            <a:tile tx="0" ty="0" sx="100000" sy="100000" flip="none" algn="tl"/>
-          </a:blipFill>
-          <a:ln>
-            <a:solidFill>
-              <a:schemeClr val="tx1"/>
-            </a:solidFill>
-          </a:ln>
-        </p:spPr>
-        <p:txBody>
-          <a:bodyPr wrap="square" rtlCol="0">
-            <a:spAutoFit/>
-          </a:bodyPr>
-          <a:lstStyle/>
-          <a:p>
-            <a:r>
-              <a:rPr lang="en-US" sz="2400" b="1" dirty="0" smtClean="0">
-                <a:latin typeface="American Typewriter"/>
-                <a:cs typeface="American Typewriter"/>
-              </a:rPr>
-              <a:t>Note: </a:t>
-            </a:r>
-            <a:r>
-              <a:rPr lang="en-US" sz="2400" dirty="0" smtClean="0">
-                <a:latin typeface="American Typewriter"/>
-                <a:cs typeface="American Typewriter"/>
-              </a:rPr>
-              <a:t>Identical to </a:t>
-            </a:r>
-            <a:r>
-              <a:rPr lang="en-US" sz="2400" dirty="0" err="1" smtClean="0">
-                <a:latin typeface="American Typewriter"/>
-                <a:cs typeface="American Typewriter"/>
-              </a:rPr>
-              <a:t>DataSet</a:t>
-            </a:r>
-            <a:r>
-              <a:rPr lang="en-US" sz="2400" dirty="0" smtClean="0">
-                <a:latin typeface="American Typewriter"/>
-                <a:cs typeface="American Typewriter"/>
-              </a:rPr>
-              <a:t> API</a:t>
-            </a:r>
-            <a:endParaRPr lang="en-US" sz="2400" dirty="0">
-              <a:latin typeface="American Typewriter"/>
-              <a:cs typeface="American Typewriter"/>
-            </a:endParaRPr>
-          </a:p>
-        </p:txBody>
-      </p:sp>
     </p:spTree>
     <p:extLst>
       <p:ext uri="{BB962C8B-B14F-4D97-AF65-F5344CB8AC3E}">
@@ -11015,7 +11234,15 @@
             </a:r>
             <a:r>
               <a:rPr lang="en-US" dirty="0" smtClean="0"/>
-              <a:t> computations</a:t>
+              <a:t> </a:t>
+            </a:r>
+            <a:r>
+              <a:rPr lang="en-US" dirty="0"/>
+              <a:t>C</a:t>
+            </a:r>
+            <a:r>
+              <a:rPr lang="en-US" dirty="0" smtClean="0"/>
+              <a:t>omputations</a:t>
             </a:r>
             <a:endParaRPr lang="en-US" dirty="0"/>
           </a:p>
@@ -11194,7 +11421,15 @@
           <a:p>
             <a:r>
               <a:rPr lang="en-US" dirty="0" smtClean="0"/>
-              <a:t>Defining local state</a:t>
+              <a:t>Defining Local </a:t>
+            </a:r>
+            <a:r>
+              <a:rPr lang="en-US" dirty="0"/>
+              <a:t>S</a:t>
+            </a:r>
+            <a:r>
+              <a:rPr lang="en-US" dirty="0" smtClean="0"/>
+              <a:t>tate</a:t>
             </a:r>
             <a:endParaRPr lang="en-US" dirty="0"/>
           </a:p>
@@ -12587,7 +12822,15 @@
           <a:p>
             <a:r>
               <a:rPr lang="en-US" dirty="0" smtClean="0"/>
-              <a:t>Defining partitioned state</a:t>
+              <a:t>Defining Partitioned </a:t>
+            </a:r>
+            <a:r>
+              <a:rPr lang="en-US" dirty="0"/>
+              <a:t>S</a:t>
+            </a:r>
+            <a:r>
+              <a:rPr lang="en-US" dirty="0" smtClean="0"/>
+              <a:t>tate</a:t>
             </a:r>
             <a:endParaRPr lang="en-US" dirty="0"/>
           </a:p>
@@ -13686,11 +13929,7 @@
           <a:p>
             <a:r>
               <a:rPr lang="en-US" dirty="0" smtClean="0"/>
-              <a:t>Connecting to Apache </a:t>
-            </a:r>
-            <a:r>
-              <a:rPr lang="en-US" dirty="0" smtClean="0"/>
-              <a:t>Kafka</a:t>
+              <a:t>Connecting to Apache Kafka</a:t>
             </a:r>
             <a:endParaRPr lang="en-US" dirty="0"/>
           </a:p>
@@ -13981,13 +14220,9 @@
           <a:p>
             <a:r>
               <a:rPr lang="en-US" dirty="0" smtClean="0"/>
-              <a:t>Reading data </a:t>
-            </a:r>
-            <a:r>
-              <a:rPr lang="en-US" smtClean="0"/>
-              <a:t>from Kafka</a:t>
-            </a:r>
-            <a:endParaRPr lang="en-US"/>
+              <a:t>Reading Data from Kafka</a:t>
+            </a:r>
+            <a:endParaRPr lang="en-US" dirty="0"/>
           </a:p>
         </p:txBody>
       </p:sp>
@@ -14750,7 +14985,7 @@
           <a:p>
             <a:r>
               <a:rPr lang="en-US" dirty="0" smtClean="0"/>
-              <a:t>Writing data to Kafka</a:t>
+              <a:t>Writing Data to Kafka</a:t>
             </a:r>
             <a:endParaRPr lang="en-US" dirty="0"/>
           </a:p>
@@ -15167,7 +15402,7 @@
           <a:p>
             <a:r>
               <a:rPr lang="en-US" dirty="0" smtClean="0"/>
-              <a:t>More API features</a:t>
+              <a:t>More API Features</a:t>
             </a:r>
             <a:endParaRPr lang="en-US" dirty="0"/>
           </a:p>
@@ -15270,7 +15505,15 @@
           <a:p>
             <a:r>
               <a:rPr lang="en-US" dirty="0" smtClean="0"/>
-              <a:t>Not covered here</a:t>
+              <a:t>Not Covered </a:t>
+            </a:r>
+            <a:r>
+              <a:rPr lang="en-US" dirty="0"/>
+              <a:t>H</a:t>
+            </a:r>
+            <a:r>
+              <a:rPr lang="en-US" dirty="0" smtClean="0"/>
+              <a:t>ere</a:t>
             </a:r>
             <a:endParaRPr lang="en-US" dirty="0"/>
           </a:p>
@@ -16388,14 +16631,14 @@
                 <a:latin typeface="Menlo Regular"/>
                 <a:cs typeface="Menlo Regular"/>
               </a:rPr>
-              <a:t>   new </a:t>
+              <a:t>   new Tuple3&lt;&gt;(</a:t>
             </a:r>
             <a:r>
               <a:rPr lang="en-US" sz="2200" dirty="0">
                 <a:latin typeface="Menlo Regular"/>
                 <a:cs typeface="Menlo Regular"/>
               </a:rPr>
-              <a:t>Tuple3(1, “2”, 3.0);</a:t>
+              <a:t>1, “2”, 3.0);</a:t>
             </a:r>
           </a:p>
           <a:p>

</xml_diff>